<commit_message>
added signatures in doc report
</commit_message>
<xml_diff>
--- a/docs/Mini Project A.pptx
+++ b/docs/Mini Project A.pptx
@@ -9803,8 +9803,8 @@
         </p:nvSpPr>
         <p:spPr>
           <a:xfrm>
-            <a:off x="3537150" y="1345000"/>
-            <a:ext cx="5017500" cy="1578900"/>
+            <a:off x="3385038" y="992850"/>
+            <a:ext cx="5160819" cy="1578900"/>
           </a:xfrm>
           <a:prstGeom prst="rect">
             <a:avLst/>
@@ -9827,7 +9827,15 @@
             </a:pPr>
             <a:r>
               <a:rPr lang="en" sz="3300" dirty="0"/>
-              <a:t>Simple social platform to connect with college peers</a:t>
+              <a:t>Simple social platform to connect with college peers (</a:t>
+            </a:r>
+            <a:r>
+              <a:rPr lang="en" sz="3300" dirty="0" err="1"/>
+              <a:t>Connecture</a:t>
+            </a:r>
+            <a:r>
+              <a:rPr lang="en" sz="3300" dirty="0"/>
+              <a:t>)</a:t>
             </a:r>
             <a:endParaRPr sz="3300" dirty="0"/>
           </a:p>

</xml_diff>